<commit_message>
small changes in ppt file
</commit_message>
<xml_diff>
--- a/Smart-Pharm-Demand-ForeCasting-2.pptx
+++ b/Smart-Pharm-Demand-ForeCasting-2.pptx
@@ -244,7 +244,7 @@
           <a:p>
             <a:fld id="{9009D877-D8EC-4F48-90F2-A8AB8F4F9DE8}" type="datetimeFigureOut">
               <a:rPr lang="en-US" smtClean="0"/>
-              <a:t>5/13/2023</a:t>
+              <a:t>6/6/2023</a:t>
             </a:fld>
             <a:endParaRPr lang="en-US"/>
           </a:p>
@@ -644,7 +644,7 @@
           <a:p>
             <a:fld id="{CA1FCF73-18F6-4924-83A0-0523C3DFB9BF}" type="datetime1">
               <a:rPr lang="en-US" smtClean="0"/>
-              <a:t>5/13/2023</a:t>
+              <a:t>6/6/2023</a:t>
             </a:fld>
             <a:endParaRPr lang="en-US" dirty="0"/>
           </a:p>
@@ -926,7 +926,7 @@
           <a:p>
             <a:fld id="{713CD5E0-50C2-4E69-9949-43C40990B382}" type="datetime1">
               <a:rPr lang="en-US" smtClean="0"/>
-              <a:t>5/13/2023</a:t>
+              <a:t>6/6/2023</a:t>
             </a:fld>
             <a:endParaRPr lang="en-US" dirty="0"/>
           </a:p>
@@ -1113,7 +1113,7 @@
           <a:p>
             <a:fld id="{EDEF86C2-E9A8-4057-A821-9233CDEB0D74}" type="datetime1">
               <a:rPr lang="en-US" smtClean="0"/>
-              <a:t>5/13/2023</a:t>
+              <a:t>6/6/2023</a:t>
             </a:fld>
             <a:endParaRPr lang="en-US" dirty="0"/>
           </a:p>
@@ -1369,7 +1369,7 @@
           <a:p>
             <a:fld id="{D1B2E1BF-AD90-484B-AC8E-9D2C7FEE86D8}" type="datetime1">
               <a:rPr lang="en-US" smtClean="0"/>
-              <a:t>5/13/2023</a:t>
+              <a:t>6/6/2023</a:t>
             </a:fld>
             <a:endParaRPr lang="en-US" dirty="0"/>
           </a:p>
@@ -1788,7 +1788,7 @@
           <a:p>
             <a:fld id="{A0F2B169-47BD-46DE-ACBF-92742B51EA00}" type="datetime1">
               <a:rPr lang="en-US" smtClean="0"/>
-              <a:t>5/13/2023</a:t>
+              <a:t>6/6/2023</a:t>
             </a:fld>
             <a:endParaRPr lang="en-US" dirty="0"/>
           </a:p>
@@ -2329,7 +2329,7 @@
           <a:p>
             <a:fld id="{EBBA4B60-50E2-4D0C-8AE8-D25C69E8585E}" type="datetime1">
               <a:rPr lang="en-US" smtClean="0"/>
-              <a:t>5/13/2023</a:t>
+              <a:t>6/6/2023</a:t>
             </a:fld>
             <a:endParaRPr lang="en-US" dirty="0"/>
           </a:p>
@@ -3164,7 +3164,7 @@
           <a:p>
             <a:fld id="{AF7B7BA5-4FC2-4D90-BAF1-CD89A3A9C066}" type="datetime1">
               <a:rPr lang="en-US" smtClean="0"/>
-              <a:t>5/13/2023</a:t>
+              <a:t>6/6/2023</a:t>
             </a:fld>
             <a:endParaRPr lang="en-US" dirty="0"/>
           </a:p>
@@ -3329,7 +3329,7 @@
           <a:p>
             <a:fld id="{7A6B5A99-21CD-47BD-819F-C6593C353CEE}" type="datetime1">
               <a:rPr lang="en-US" smtClean="0"/>
-              <a:t>5/13/2023</a:t>
+              <a:t>6/6/2023</a:t>
             </a:fld>
             <a:endParaRPr lang="en-US" dirty="0"/>
           </a:p>
@@ -3508,7 +3508,7 @@
           <a:p>
             <a:fld id="{3D04BBDA-BBBB-4611-B1AA-AC5794579481}" type="datetime1">
               <a:rPr lang="en-US" smtClean="0"/>
-              <a:t>5/13/2023</a:t>
+              <a:t>6/6/2023</a:t>
             </a:fld>
             <a:endParaRPr lang="en-US" dirty="0"/>
           </a:p>
@@ -3673,7 +3673,7 @@
           <a:p>
             <a:fld id="{AC0900A5-AF58-4654-8563-FAA17B4ECDA2}" type="datetime1">
               <a:rPr lang="en-US" smtClean="0"/>
-              <a:t>5/13/2023</a:t>
+              <a:t>6/6/2023</a:t>
             </a:fld>
             <a:endParaRPr lang="en-US" dirty="0"/>
           </a:p>
@@ -3916,7 +3916,7 @@
           <a:p>
             <a:fld id="{3C553573-1A62-4127-9727-6FAA611C6476}" type="datetime1">
               <a:rPr lang="en-US" smtClean="0"/>
-              <a:t>5/13/2023</a:t>
+              <a:t>6/6/2023</a:t>
             </a:fld>
             <a:endParaRPr lang="en-US" dirty="0"/>
           </a:p>
@@ -4148,7 +4148,7 @@
           <a:p>
             <a:fld id="{12E46BEB-44A8-43FC-AA6F-4F9CA8442330}" type="datetime1">
               <a:rPr lang="en-US" smtClean="0"/>
-              <a:t>5/13/2023</a:t>
+              <a:t>6/6/2023</a:t>
             </a:fld>
             <a:endParaRPr lang="en-US" dirty="0"/>
           </a:p>
@@ -4516,7 +4516,7 @@
           <a:p>
             <a:fld id="{0B59A7C9-C0D5-475F-A91C-F4A49D0B35BE}" type="datetime1">
               <a:rPr lang="en-US" smtClean="0"/>
-              <a:t>5/13/2023</a:t>
+              <a:t>6/6/2023</a:t>
             </a:fld>
             <a:endParaRPr lang="en-US" dirty="0"/>
           </a:p>
@@ -4629,7 +4629,7 @@
           <a:p>
             <a:fld id="{992808EC-41CC-4FD0-8AD3-58B3EEEE4223}" type="datetime1">
               <a:rPr lang="en-US" smtClean="0"/>
-              <a:t>5/13/2023</a:t>
+              <a:t>6/6/2023</a:t>
             </a:fld>
             <a:endParaRPr lang="en-US" dirty="0"/>
           </a:p>
@@ -4719,7 +4719,7 @@
           <a:p>
             <a:fld id="{2B271DA6-BF90-49AB-ADA7-8AB760CBDB7C}" type="datetime1">
               <a:rPr lang="en-US" smtClean="0"/>
-              <a:t>5/13/2023</a:t>
+              <a:t>6/6/2023</a:t>
             </a:fld>
             <a:endParaRPr lang="en-US" dirty="0"/>
           </a:p>
@@ -4965,7 +4965,7 @@
           <a:p>
             <a:fld id="{DF137134-386D-4F8B-B7BD-0A956EE5A87E}" type="datetime1">
               <a:rPr lang="en-US" smtClean="0"/>
-              <a:t>5/13/2023</a:t>
+              <a:t>6/6/2023</a:t>
             </a:fld>
             <a:endParaRPr lang="en-US" dirty="0"/>
           </a:p>
@@ -5247,7 +5247,7 @@
           <a:p>
             <a:fld id="{9C481A35-8F21-4421-9780-5A99A9AE1261}" type="datetime1">
               <a:rPr lang="en-US" smtClean="0"/>
-              <a:t>5/13/2023</a:t>
+              <a:t>6/6/2023</a:t>
             </a:fld>
             <a:endParaRPr lang="en-US" dirty="0"/>
           </a:p>
@@ -5455,7 +5455,7 @@
           <a:p>
             <a:fld id="{A7475B8C-23FC-4F14-B348-5EB2DEC0EBA9}" type="datetime1">
               <a:rPr lang="en-US" smtClean="0"/>
-              <a:t>5/13/2023</a:t>
+              <a:t>6/6/2023</a:t>
             </a:fld>
             <a:endParaRPr lang="en-US" dirty="0"/>
           </a:p>
@@ -7136,38 +7136,6 @@
           <a:chExt cx="0" cy="0"/>
         </a:xfrm>
       </p:grpSpPr>
-      <p:pic>
-        <p:nvPicPr>
-          <p:cNvPr id="4" name="Picture 4" descr="Diagram&#10;&#10;Description automatically generated">
-            <a:extLst>
-              <a:ext uri="{FF2B5EF4-FFF2-40B4-BE49-F238E27FC236}">
-                <a16:creationId xmlns:a16="http://schemas.microsoft.com/office/drawing/2014/main" id="{CC8F243B-A6F8-4963-AEDA-BF0306CD0C04}"/>
-              </a:ext>
-            </a:extLst>
-          </p:cNvPr>
-          <p:cNvPicPr>
-            <a:picLocks noGrp="1" noChangeAspect="1"/>
-          </p:cNvPicPr>
-          <p:nvPr>
-            <p:ph idx="1"/>
-          </p:nvPr>
-        </p:nvPicPr>
-        <p:blipFill>
-          <a:blip r:embed="rId2"/>
-          <a:stretch>
-            <a:fillRect/>
-          </a:stretch>
-        </p:blipFill>
-        <p:spPr>
-          <a:xfrm>
-            <a:off x="3055200" y="2095500"/>
-            <a:ext cx="6072074" cy="3695700"/>
-          </a:xfrm>
-          <a:prstGeom prst="rect">
-            <a:avLst/>
-          </a:prstGeom>
-        </p:spPr>
-      </p:pic>
       <p:sp>
         <p:nvSpPr>
           <p:cNvPr id="6" name="Slide Number Placeholder 5">
@@ -7194,6 +7162,31 @@
               <a:t>13</a:t>
             </a:fld>
             <a:endParaRPr lang="en-US" dirty="0"/>
+          </a:p>
+        </p:txBody>
+      </p:sp>
+      <p:sp>
+        <p:nvSpPr>
+          <p:cNvPr id="3" name="Content Placeholder 2">
+            <a:extLst>
+              <a:ext uri="{FF2B5EF4-FFF2-40B4-BE49-F238E27FC236}">
+                <a16:creationId xmlns:a16="http://schemas.microsoft.com/office/drawing/2014/main" id="{1C25A843-F9D9-4A3F-8410-7C160A633D5D}"/>
+              </a:ext>
+            </a:extLst>
+          </p:cNvPr>
+          <p:cNvSpPr>
+            <a:spLocks noGrp="1"/>
+          </p:cNvSpPr>
+          <p:nvPr>
+            <p:ph idx="1"/>
+          </p:nvPr>
+        </p:nvSpPr>
+        <p:spPr/>
+        <p:txBody>
+          <a:bodyPr/>
+          <a:lstStyle/>
+          <a:p>
+            <a:endParaRPr lang="en-US"/>
           </a:p>
         </p:txBody>
       </p:sp>

</xml_diff>